<commit_message>
[docs] append frontend demo screenshot to pre1 ppt p.17
</commit_message>
<xml_diff>
--- a/documentation/presentation 1/proposal_pre.pptx
+++ b/documentation/presentation 1/proposal_pre.pptx
@@ -5,7 +5,7 @@
     <p:sldMasterId id="2147483733" r:id="rId1"/>
   </p:sldMasterIdLst>
   <p:notesMasterIdLst>
-    <p:notesMasterId r:id="rId26"/>
+    <p:notesMasterId r:id="rId27"/>
   </p:notesMasterIdLst>
   <p:sldIdLst>
     <p:sldId id="256" r:id="rId2"/>
@@ -24,14 +24,15 @@
     <p:sldId id="269" r:id="rId15"/>
     <p:sldId id="308" r:id="rId16"/>
     <p:sldId id="270" r:id="rId17"/>
-    <p:sldId id="309" r:id="rId18"/>
-    <p:sldId id="262" r:id="rId19"/>
-    <p:sldId id="310" r:id="rId20"/>
-    <p:sldId id="263" r:id="rId21"/>
-    <p:sldId id="311" r:id="rId22"/>
-    <p:sldId id="264" r:id="rId23"/>
-    <p:sldId id="266" r:id="rId24"/>
-    <p:sldId id="2675" r:id="rId25"/>
+    <p:sldId id="2676" r:id="rId18"/>
+    <p:sldId id="309" r:id="rId19"/>
+    <p:sldId id="262" r:id="rId20"/>
+    <p:sldId id="310" r:id="rId21"/>
+    <p:sldId id="263" r:id="rId22"/>
+    <p:sldId id="311" r:id="rId23"/>
+    <p:sldId id="264" r:id="rId24"/>
+    <p:sldId id="266" r:id="rId25"/>
+    <p:sldId id="2675" r:id="rId26"/>
   </p:sldIdLst>
   <p:sldSz cx="12192000" cy="6858000"/>
   <p:notesSz cx="6858000" cy="9144000"/>
@@ -141,7 +142,7 @@
 <file path=ppt/charts/chart1.xml><?xml version="1.0" encoding="utf-8"?>
 <c:chartSpace xmlns:c="http://schemas.openxmlformats.org/drawingml/2006/chart" xmlns:a="http://schemas.openxmlformats.org/drawingml/2006/main" xmlns:r="http://schemas.openxmlformats.org/officeDocument/2006/relationships" xmlns:c16r2="http://schemas.microsoft.com/office/drawing/2015/06/chart">
   <c:date1904 val="0"/>
-  <c:lang val="zh-CN"/>
+  <c:lang val="en-US"/>
   <c:roundedCorners val="0"/>
   <mc:AlternateContent xmlns:mc="http://schemas.openxmlformats.org/markup-compatibility/2006">
     <mc:Choice xmlns:c14="http://schemas.microsoft.com/office/drawing/2007/8/2/chart" Requires="c14">
@@ -178,7 +179,7 @@
               <a:cs typeface="+mn-cs"/>
             </a:defRPr>
           </a:pPr>
-          <a:endParaRPr lang="zh-CN"/>
+          <a:endParaRPr lang="en-CN"/>
         </a:p>
       </c:txPr>
     </c:title>
@@ -288,7 +289,7 @@
                     <a:cs typeface="+mn-cs"/>
                   </a:defRPr>
                 </a:pPr>
-                <a:endParaRPr lang="zh-CN"/>
+                <a:endParaRPr lang="en-CN"/>
               </a:p>
             </c:txPr>
             <c:dLblPos val="bestFit"/>
@@ -415,7 +416,7 @@
               <a:cs typeface="+mn-cs"/>
             </a:defRPr>
           </a:pPr>
-          <a:endParaRPr lang="zh-CN"/>
+          <a:endParaRPr lang="en-CN"/>
         </a:p>
       </c:txPr>
     </c:legend>
@@ -444,7 +445,7 @@
       <a:pPr>
         <a:defRPr/>
       </a:pPr>
-      <a:endParaRPr lang="zh-CN"/>
+      <a:endParaRPr lang="en-CN"/>
     </a:p>
   </c:txPr>
   <c:externalData r:id="rId3">
@@ -456,7 +457,7 @@
 <file path=ppt/charts/chart2.xml><?xml version="1.0" encoding="utf-8"?>
 <c:chartSpace xmlns:c="http://schemas.openxmlformats.org/drawingml/2006/chart" xmlns:a="http://schemas.openxmlformats.org/drawingml/2006/main" xmlns:r="http://schemas.openxmlformats.org/officeDocument/2006/relationships" xmlns:c16r2="http://schemas.microsoft.com/office/drawing/2015/06/chart">
   <c:date1904 val="0"/>
-  <c:lang val="zh-CN"/>
+  <c:lang val="en-US"/>
   <c:roundedCorners val="0"/>
   <mc:AlternateContent xmlns:mc="http://schemas.openxmlformats.org/markup-compatibility/2006">
     <mc:Choice xmlns:c14="http://schemas.microsoft.com/office/drawing/2007/8/2/chart" Requires="c14">
@@ -493,7 +494,7 @@
               <a:cs typeface="+mn-cs"/>
             </a:defRPr>
           </a:pPr>
-          <a:endParaRPr lang="zh-CN"/>
+          <a:endParaRPr lang="en-CN"/>
         </a:p>
       </c:txPr>
     </c:title>
@@ -603,7 +604,7 @@
                     <a:cs typeface="+mn-cs"/>
                   </a:defRPr>
                 </a:pPr>
-                <a:endParaRPr lang="zh-CN"/>
+                <a:endParaRPr lang="en-CN"/>
               </a:p>
             </c:txPr>
             <c:dLblPos val="bestFit"/>
@@ -730,7 +731,7 @@
               <a:cs typeface="+mn-cs"/>
             </a:defRPr>
           </a:pPr>
-          <a:endParaRPr lang="zh-CN"/>
+          <a:endParaRPr lang="en-CN"/>
         </a:p>
       </c:txPr>
     </c:legend>
@@ -759,7 +760,7 @@
       <a:pPr>
         <a:defRPr/>
       </a:pPr>
-      <a:endParaRPr lang="zh-CN"/>
+      <a:endParaRPr lang="en-CN"/>
     </a:p>
   </c:txPr>
   <c:externalData r:id="rId3">
@@ -771,7 +772,7 @@
 <file path=ppt/charts/chart3.xml><?xml version="1.0" encoding="utf-8"?>
 <c:chartSpace xmlns:c="http://schemas.openxmlformats.org/drawingml/2006/chart" xmlns:a="http://schemas.openxmlformats.org/drawingml/2006/main" xmlns:r="http://schemas.openxmlformats.org/officeDocument/2006/relationships" xmlns:c16r2="http://schemas.microsoft.com/office/drawing/2015/06/chart">
   <c:date1904 val="0"/>
-  <c:lang val="zh-CN"/>
+  <c:lang val="en-US"/>
   <c:roundedCorners val="0"/>
   <mc:AlternateContent xmlns:mc="http://schemas.openxmlformats.org/markup-compatibility/2006">
     <mc:Choice xmlns:c14="http://schemas.microsoft.com/office/drawing/2007/8/2/chart" Requires="c14">
@@ -816,7 +817,7 @@
               <a:cs typeface="+mn-cs"/>
             </a:defRPr>
           </a:pPr>
-          <a:endParaRPr lang="zh-CN"/>
+          <a:endParaRPr lang="en-CN"/>
         </a:p>
       </c:txPr>
     </c:title>
@@ -926,7 +927,7 @@
                     <a:cs typeface="+mn-cs"/>
                   </a:defRPr>
                 </a:pPr>
-                <a:endParaRPr lang="zh-CN"/>
+                <a:endParaRPr lang="en-CN"/>
               </a:p>
             </c:txPr>
             <c:dLblPos val="bestFit"/>
@@ -1053,7 +1054,7 @@
               <a:cs typeface="+mn-cs"/>
             </a:defRPr>
           </a:pPr>
-          <a:endParaRPr lang="zh-CN"/>
+          <a:endParaRPr lang="en-CN"/>
         </a:p>
       </c:txPr>
     </c:legend>
@@ -1082,7 +1083,7 @@
       <a:pPr>
         <a:defRPr/>
       </a:pPr>
-      <a:endParaRPr lang="zh-CN"/>
+      <a:endParaRPr lang="en-CN"/>
     </a:p>
   </c:txPr>
   <c:externalData r:id="rId3">
@@ -1094,7 +1095,7 @@
 <file path=ppt/charts/chart4.xml><?xml version="1.0" encoding="utf-8"?>
 <c:chartSpace xmlns:c="http://schemas.openxmlformats.org/drawingml/2006/chart" xmlns:a="http://schemas.openxmlformats.org/drawingml/2006/main" xmlns:r="http://schemas.openxmlformats.org/officeDocument/2006/relationships" xmlns:c16r2="http://schemas.microsoft.com/office/drawing/2015/06/chart">
   <c:date1904 val="0"/>
-  <c:lang val="zh-CN"/>
+  <c:lang val="en-US"/>
   <c:roundedCorners val="0"/>
   <mc:AlternateContent xmlns:mc="http://schemas.openxmlformats.org/markup-compatibility/2006">
     <mc:Choice xmlns:c14="http://schemas.microsoft.com/office/drawing/2007/8/2/chart" Requires="c14">
@@ -1131,7 +1132,7 @@
               <a:cs typeface="+mn-cs"/>
             </a:defRPr>
           </a:pPr>
-          <a:endParaRPr lang="zh-CN"/>
+          <a:endParaRPr lang="en-CN"/>
         </a:p>
       </c:txPr>
     </c:title>
@@ -1241,7 +1242,7 @@
                     <a:cs typeface="+mn-cs"/>
                   </a:defRPr>
                 </a:pPr>
-                <a:endParaRPr lang="zh-CN"/>
+                <a:endParaRPr lang="en-CN"/>
               </a:p>
             </c:txPr>
             <c:dLblPos val="bestFit"/>
@@ -1358,7 +1359,7 @@
               <a:cs typeface="+mn-cs"/>
             </a:defRPr>
           </a:pPr>
-          <a:endParaRPr lang="zh-CN"/>
+          <a:endParaRPr lang="en-CN"/>
         </a:p>
       </c:txPr>
     </c:legend>
@@ -1387,7 +1388,7 @@
       <a:pPr>
         <a:defRPr/>
       </a:pPr>
-      <a:endParaRPr lang="zh-CN"/>
+      <a:endParaRPr lang="en-CN"/>
     </a:p>
   </c:txPr>
   <c:externalData r:id="rId3">
@@ -1399,7 +1400,7 @@
 <file path=ppt/charts/chart5.xml><?xml version="1.0" encoding="utf-8"?>
 <c:chartSpace xmlns:c="http://schemas.openxmlformats.org/drawingml/2006/chart" xmlns:a="http://schemas.openxmlformats.org/drawingml/2006/main" xmlns:r="http://schemas.openxmlformats.org/officeDocument/2006/relationships" xmlns:c16r2="http://schemas.microsoft.com/office/drawing/2015/06/chart">
   <c:date1904 val="0"/>
-  <c:lang val="zh-CN"/>
+  <c:lang val="en-US"/>
   <c:roundedCorners val="0"/>
   <mc:AlternateContent xmlns:mc="http://schemas.openxmlformats.org/markup-compatibility/2006">
     <mc:Choice xmlns:c14="http://schemas.microsoft.com/office/drawing/2007/8/2/chart" Requires="c14">
@@ -1444,7 +1445,7 @@
               <a:cs typeface="+mn-cs"/>
             </a:defRPr>
           </a:pPr>
-          <a:endParaRPr lang="zh-CN"/>
+          <a:endParaRPr lang="en-CN"/>
         </a:p>
       </c:txPr>
     </c:title>
@@ -1534,7 +1535,7 @@
                     <a:cs typeface="+mn-cs"/>
                   </a:defRPr>
                 </a:pPr>
-                <a:endParaRPr lang="zh-CN"/>
+                <a:endParaRPr lang="en-CN"/>
               </a:p>
             </c:txPr>
             <c:dLblPos val="bestFit"/>
@@ -1645,7 +1646,7 @@
               <a:cs typeface="+mn-cs"/>
             </a:defRPr>
           </a:pPr>
-          <a:endParaRPr lang="zh-CN"/>
+          <a:endParaRPr lang="en-CN"/>
         </a:p>
       </c:txPr>
     </c:legend>
@@ -1674,7 +1675,7 @@
       <a:pPr>
         <a:defRPr/>
       </a:pPr>
-      <a:endParaRPr lang="zh-CN"/>
+      <a:endParaRPr lang="en-CN"/>
     </a:p>
   </c:txPr>
   <c:externalData r:id="rId3">
@@ -4560,7 +4561,7 @@
           <a:p>
             <a:fld id="{DD4885B1-F2D1-4422-9BEB-519C2FD4F614}" type="datetimeFigureOut">
               <a:rPr lang="zh-CN" altLang="en-US" smtClean="0"/>
-              <a:t>2022/3/13</a:t>
+              <a:t>2022/3/14</a:t>
             </a:fld>
             <a:endParaRPr lang="zh-CN" altLang="en-US"/>
           </a:p>
@@ -5348,6 +5349,90 @@
       </p:grpSpPr>
       <p:sp>
         <p:nvSpPr>
+          <p:cNvPr id="2" name="Slide Image Placeholder 1"/>
+          <p:cNvSpPr>
+            <a:spLocks noGrp="1" noRot="1" noChangeAspect="1"/>
+          </p:cNvSpPr>
+          <p:nvPr>
+            <p:ph type="sldImg"/>
+          </p:nvPr>
+        </p:nvSpPr>
+        <p:spPr/>
+      </p:sp>
+      <p:sp>
+        <p:nvSpPr>
+          <p:cNvPr id="3" name="Notes Placeholder 2"/>
+          <p:cNvSpPr>
+            <a:spLocks noGrp="1"/>
+          </p:cNvSpPr>
+          <p:nvPr>
+            <p:ph type="body" idx="1"/>
+          </p:nvPr>
+        </p:nvSpPr>
+        <p:spPr/>
+        <p:txBody>
+          <a:bodyPr/>
+          <a:lstStyle/>
+          <a:p>
+            <a:endParaRPr lang="en-CN"/>
+          </a:p>
+        </p:txBody>
+      </p:sp>
+      <p:sp>
+        <p:nvSpPr>
+          <p:cNvPr id="4" name="Slide Number Placeholder 3"/>
+          <p:cNvSpPr>
+            <a:spLocks noGrp="1"/>
+          </p:cNvSpPr>
+          <p:nvPr>
+            <p:ph type="sldNum" sz="quarter" idx="5"/>
+          </p:nvPr>
+        </p:nvSpPr>
+        <p:spPr/>
+        <p:txBody>
+          <a:bodyPr/>
+          <a:lstStyle/>
+          <a:p>
+            <a:fld id="{512B212D-492F-4917-9BF5-9006971F9FE6}" type="slidenum">
+              <a:rPr lang="zh-CN" altLang="en-US" smtClean="0"/>
+              <a:t>17</a:t>
+            </a:fld>
+            <a:endParaRPr lang="zh-CN" altLang="en-US"/>
+          </a:p>
+        </p:txBody>
+      </p:sp>
+    </p:spTree>
+    <p:extLst>
+      <p:ext uri="{BB962C8B-B14F-4D97-AF65-F5344CB8AC3E}">
+        <p14:creationId xmlns:p14="http://schemas.microsoft.com/office/powerpoint/2010/main" val="2529446841"/>
+      </p:ext>
+    </p:extLst>
+  </p:cSld>
+  <p:clrMapOvr>
+    <a:masterClrMapping/>
+  </p:clrMapOvr>
+</p:notes>
+</file>
+
+<file path=ppt/notesSlides/notesSlide7.xml><?xml version="1.0" encoding="utf-8"?>
+<p:notes xmlns:a="http://schemas.openxmlformats.org/drawingml/2006/main" xmlns:r="http://schemas.openxmlformats.org/officeDocument/2006/relationships" xmlns:p="http://schemas.openxmlformats.org/presentationml/2006/main">
+  <p:cSld>
+    <p:spTree>
+      <p:nvGrpSpPr>
+        <p:cNvPr id="1" name=""/>
+        <p:cNvGrpSpPr/>
+        <p:nvPr/>
+      </p:nvGrpSpPr>
+      <p:grpSpPr>
+        <a:xfrm>
+          <a:off x="0" y="0"/>
+          <a:ext cx="0" cy="0"/>
+          <a:chOff x="0" y="0"/>
+          <a:chExt cx="0" cy="0"/>
+        </a:xfrm>
+      </p:grpSpPr>
+      <p:sp>
+        <p:nvSpPr>
           <p:cNvPr id="2" name="幻灯片图像占位符 1"/>
           <p:cNvSpPr>
             <a:spLocks noGrp="1" noRot="1" noChangeAspect="1"/>
@@ -5394,7 +5479,7 @@
           <a:p>
             <a:fld id="{512B212D-492F-4917-9BF5-9006971F9FE6}" type="slidenum">
               <a:rPr lang="zh-CN" altLang="en-US" smtClean="0"/>
-              <a:t>23</a:t>
+              <a:t>24</a:t>
             </a:fld>
             <a:endParaRPr lang="zh-CN" altLang="en-US"/>
           </a:p>
@@ -15675,6 +15760,143 @@
 <file path=ppt/slides/slide17.xml><?xml version="1.0" encoding="utf-8"?>
 <p:sld xmlns:a="http://schemas.openxmlformats.org/drawingml/2006/main" xmlns:r="http://schemas.openxmlformats.org/officeDocument/2006/relationships" xmlns:p="http://schemas.openxmlformats.org/presentationml/2006/main">
   <p:cSld>
+    <p:spTree>
+      <p:nvGrpSpPr>
+        <p:cNvPr id="1" name=""/>
+        <p:cNvGrpSpPr/>
+        <p:nvPr/>
+      </p:nvGrpSpPr>
+      <p:grpSpPr>
+        <a:xfrm>
+          <a:off x="0" y="0"/>
+          <a:ext cx="0" cy="0"/>
+          <a:chOff x="0" y="0"/>
+          <a:chExt cx="0" cy="0"/>
+        </a:xfrm>
+      </p:grpSpPr>
+      <p:sp>
+        <p:nvSpPr>
+          <p:cNvPr id="5" name="文本框 4">
+            <a:extLst>
+              <a:ext uri="{FF2B5EF4-FFF2-40B4-BE49-F238E27FC236}">
+                <a16:creationId xmlns:a16="http://schemas.microsoft.com/office/drawing/2014/main" id="{1EB92D64-07EB-42A6-BADD-D570BD6183B0}"/>
+              </a:ext>
+            </a:extLst>
+          </p:cNvPr>
+          <p:cNvSpPr txBox="1"/>
+          <p:nvPr/>
+        </p:nvSpPr>
+        <p:spPr>
+          <a:xfrm>
+            <a:off x="448495" y="863558"/>
+            <a:ext cx="8903323" cy="584775"/>
+          </a:xfrm>
+          <a:prstGeom prst="rect">
+            <a:avLst/>
+          </a:prstGeom>
+          <a:noFill/>
+        </p:spPr>
+        <p:txBody>
+          <a:bodyPr wrap="square" rtlCol="0">
+            <a:spAutoFit/>
+          </a:bodyPr>
+          <a:lstStyle/>
+          <a:p>
+            <a:r>
+              <a:rPr lang="en-US" altLang="zh-CN" sz="3200" b="1" dirty="0">
+                <a:latin typeface="Times New Roman" panose="02020603050405020304" pitchFamily="18" charset="0"/>
+                <a:cs typeface="Times New Roman" panose="02020603050405020304" pitchFamily="18" charset="0"/>
+              </a:rPr>
+              <a:t>Demonstration of Frontend Interface Design</a:t>
+            </a:r>
+            <a:endParaRPr lang="zh-CN" altLang="en-US" sz="3200" b="1" dirty="0">
+              <a:latin typeface="Times New Roman" panose="02020603050405020304" pitchFamily="18" charset="0"/>
+              <a:cs typeface="Times New Roman" panose="02020603050405020304" pitchFamily="18" charset="0"/>
+            </a:endParaRPr>
+          </a:p>
+        </p:txBody>
+      </p:sp>
+      <p:sp>
+        <p:nvSpPr>
+          <p:cNvPr id="2" name="灯片编号占位符 1">
+            <a:extLst>
+              <a:ext uri="{FF2B5EF4-FFF2-40B4-BE49-F238E27FC236}">
+                <a16:creationId xmlns:a16="http://schemas.microsoft.com/office/drawing/2014/main" id="{6E23ED6A-6812-41CE-9122-9D94BBE8E437}"/>
+              </a:ext>
+            </a:extLst>
+          </p:cNvPr>
+          <p:cNvSpPr>
+            <a:spLocks noGrp="1"/>
+          </p:cNvSpPr>
+          <p:nvPr>
+            <p:ph type="sldNum" sz="quarter" idx="12"/>
+          </p:nvPr>
+        </p:nvSpPr>
+        <p:spPr/>
+        <p:txBody>
+          <a:bodyPr/>
+          <a:lstStyle/>
+          <a:p>
+            <a:fld id="{B4868FC9-AF3C-4454-80EF-91C4AEE13AC0}" type="slidenum">
+              <a:rPr lang="zh-CN" altLang="en-US" smtClean="0"/>
+              <a:t>17</a:t>
+            </a:fld>
+            <a:endParaRPr lang="zh-CN" altLang="en-US"/>
+          </a:p>
+        </p:txBody>
+      </p:sp>
+      <p:pic>
+        <p:nvPicPr>
+          <p:cNvPr id="4" name="Picture 3" descr="Graphical user interface, text, application&#10;&#10;Description automatically generated">
+            <a:extLst>
+              <a:ext uri="{FF2B5EF4-FFF2-40B4-BE49-F238E27FC236}">
+                <a16:creationId xmlns:a16="http://schemas.microsoft.com/office/drawing/2014/main" id="{9E952528-C0B6-A249-BE9A-03EBC2068D7A}"/>
+              </a:ext>
+            </a:extLst>
+          </p:cNvPr>
+          <p:cNvPicPr>
+            <a:picLocks noChangeAspect="1"/>
+          </p:cNvPicPr>
+          <p:nvPr/>
+        </p:nvPicPr>
+        <p:blipFill>
+          <a:blip r:embed="rId3">
+            <a:extLst>
+              <a:ext uri="{28A0092B-C50C-407E-A947-70E740481C1C}">
+                <a14:useLocalDpi xmlns:a14="http://schemas.microsoft.com/office/drawing/2010/main" val="0"/>
+              </a:ext>
+            </a:extLst>
+          </a:blip>
+          <a:stretch>
+            <a:fillRect/>
+          </a:stretch>
+        </p:blipFill>
+        <p:spPr>
+          <a:xfrm>
+            <a:off x="365125" y="1679466"/>
+            <a:ext cx="8097502" cy="4727021"/>
+          </a:xfrm>
+          <a:prstGeom prst="rect">
+            <a:avLst/>
+          </a:prstGeom>
+        </p:spPr>
+      </p:pic>
+    </p:spTree>
+    <p:extLst>
+      <p:ext uri="{BB962C8B-B14F-4D97-AF65-F5344CB8AC3E}">
+        <p14:creationId xmlns:p14="http://schemas.microsoft.com/office/powerpoint/2010/main" val="1908525285"/>
+      </p:ext>
+    </p:extLst>
+  </p:cSld>
+  <p:clrMapOvr>
+    <a:masterClrMapping/>
+  </p:clrMapOvr>
+</p:sld>
+</file>
+
+<file path=ppt/slides/slide18.xml><?xml version="1.0" encoding="utf-8"?>
+<p:sld xmlns:a="http://schemas.openxmlformats.org/drawingml/2006/main" xmlns:r="http://schemas.openxmlformats.org/officeDocument/2006/relationships" xmlns:p="http://schemas.openxmlformats.org/presentationml/2006/main">
+  <p:cSld>
     <p:bg>
       <p:bgPr>
         <a:solidFill>
@@ -16094,7 +16316,7 @@
 </p:sld>
 </file>
 
-<file path=ppt/slides/slide18.xml><?xml version="1.0" encoding="utf-8"?>
+<file path=ppt/slides/slide19.xml><?xml version="1.0" encoding="utf-8"?>
 <p:sld xmlns:a="http://schemas.openxmlformats.org/drawingml/2006/main" xmlns:r="http://schemas.openxmlformats.org/officeDocument/2006/relationships" xmlns:p="http://schemas.openxmlformats.org/presentationml/2006/main">
   <p:cSld>
     <p:spTree>
@@ -16394,7 +16616,7 @@
           <a:p>
             <a:fld id="{B4868FC9-AF3C-4454-80EF-91C4AEE13AC0}" type="slidenum">
               <a:rPr lang="zh-CN" altLang="en-US" smtClean="0"/>
-              <a:t>18</a:t>
+              <a:t>19</a:t>
             </a:fld>
             <a:endParaRPr lang="zh-CN" altLang="en-US"/>
           </a:p>
@@ -16413,7 +16635,402 @@
 </p:sld>
 </file>
 
-<file path=ppt/slides/slide19.xml><?xml version="1.0" encoding="utf-8"?>
+<file path=ppt/slides/slide2.xml><?xml version="1.0" encoding="utf-8"?>
+<p:sld xmlns:a="http://schemas.openxmlformats.org/drawingml/2006/main" xmlns:r="http://schemas.openxmlformats.org/officeDocument/2006/relationships" xmlns:p="http://schemas.openxmlformats.org/presentationml/2006/main">
+  <p:cSld>
+    <p:spTree>
+      <p:nvGrpSpPr>
+        <p:cNvPr id="1" name=""/>
+        <p:cNvGrpSpPr/>
+        <p:nvPr/>
+      </p:nvGrpSpPr>
+      <p:grpSpPr>
+        <a:xfrm>
+          <a:off x="0" y="0"/>
+          <a:ext cx="0" cy="0"/>
+          <a:chOff x="0" y="0"/>
+          <a:chExt cx="0" cy="0"/>
+        </a:xfrm>
+      </p:grpSpPr>
+      <p:sp>
+        <p:nvSpPr>
+          <p:cNvPr id="4" name="文本框 3">
+            <a:extLst>
+              <a:ext uri="{FF2B5EF4-FFF2-40B4-BE49-F238E27FC236}">
+                <a16:creationId xmlns:a16="http://schemas.microsoft.com/office/drawing/2014/main" id="{D529DC3D-4B51-4BA9-89BB-AFE326F7D787}"/>
+              </a:ext>
+            </a:extLst>
+          </p:cNvPr>
+          <p:cNvSpPr txBox="1"/>
+          <p:nvPr/>
+        </p:nvSpPr>
+        <p:spPr>
+          <a:xfrm>
+            <a:off x="344402" y="313325"/>
+            <a:ext cx="2640513" cy="707886"/>
+          </a:xfrm>
+          <a:prstGeom prst="rect">
+            <a:avLst/>
+          </a:prstGeom>
+          <a:noFill/>
+        </p:spPr>
+        <p:txBody>
+          <a:bodyPr wrap="square" rtlCol="0">
+            <a:spAutoFit/>
+          </a:bodyPr>
+          <a:lstStyle/>
+          <a:p>
+            <a:r>
+              <a:rPr lang="en-US" altLang="zh-CN" sz="4000" b="1" dirty="0">
+                <a:latin typeface="Times New Roman" panose="02020603050405020304" pitchFamily="18" charset="0"/>
+                <a:cs typeface="Times New Roman" panose="02020603050405020304" pitchFamily="18" charset="0"/>
+              </a:rPr>
+              <a:t>Contents</a:t>
+            </a:r>
+            <a:endParaRPr lang="zh-CN" altLang="en-US" sz="4000" b="1" dirty="0">
+              <a:latin typeface="Times New Roman" panose="02020603050405020304" pitchFamily="18" charset="0"/>
+              <a:cs typeface="Times New Roman" panose="02020603050405020304" pitchFamily="18" charset="0"/>
+            </a:endParaRPr>
+          </a:p>
+        </p:txBody>
+      </p:sp>
+      <p:sp>
+        <p:nvSpPr>
+          <p:cNvPr id="5" name="文本框 4">
+            <a:extLst>
+              <a:ext uri="{FF2B5EF4-FFF2-40B4-BE49-F238E27FC236}">
+                <a16:creationId xmlns:a16="http://schemas.microsoft.com/office/drawing/2014/main" id="{733F408E-51A1-40CB-8000-F65F3BDF3340}"/>
+              </a:ext>
+            </a:extLst>
+          </p:cNvPr>
+          <p:cNvSpPr txBox="1"/>
+          <p:nvPr/>
+        </p:nvSpPr>
+        <p:spPr>
+          <a:xfrm>
+            <a:off x="609600" y="1217602"/>
+            <a:ext cx="6543040" cy="461665"/>
+          </a:xfrm>
+          <a:prstGeom prst="rect">
+            <a:avLst/>
+          </a:prstGeom>
+          <a:noFill/>
+        </p:spPr>
+        <p:txBody>
+          <a:bodyPr wrap="square">
+            <a:spAutoFit/>
+          </a:bodyPr>
+          <a:lstStyle/>
+          <a:p>
+            <a:r>
+              <a:rPr lang="en-US" altLang="zh-CN" sz="2400" b="1" dirty="0">
+                <a:latin typeface="Times New Roman" panose="02020603050405020304" pitchFamily="18" charset="0"/>
+                <a:cs typeface="Times New Roman" panose="02020603050405020304" pitchFamily="18" charset="0"/>
+              </a:rPr>
+              <a:t>01 | Problem Definition and Goal</a:t>
+            </a:r>
+            <a:endParaRPr lang="zh-CN" altLang="en-US" sz="2400" b="1" dirty="0">
+              <a:latin typeface="Times New Roman" panose="02020603050405020304" pitchFamily="18" charset="0"/>
+              <a:cs typeface="Times New Roman" panose="02020603050405020304" pitchFamily="18" charset="0"/>
+            </a:endParaRPr>
+          </a:p>
+        </p:txBody>
+      </p:sp>
+      <p:sp>
+        <p:nvSpPr>
+          <p:cNvPr id="6" name="文本框 5">
+            <a:extLst>
+              <a:ext uri="{FF2B5EF4-FFF2-40B4-BE49-F238E27FC236}">
+                <a16:creationId xmlns:a16="http://schemas.microsoft.com/office/drawing/2014/main" id="{48A37062-2E67-4904-93CD-A141E881BD08}"/>
+              </a:ext>
+            </a:extLst>
+          </p:cNvPr>
+          <p:cNvSpPr txBox="1"/>
+          <p:nvPr/>
+        </p:nvSpPr>
+        <p:spPr>
+          <a:xfrm>
+            <a:off x="609600" y="1873951"/>
+            <a:ext cx="6543040" cy="461665"/>
+          </a:xfrm>
+          <a:prstGeom prst="rect">
+            <a:avLst/>
+          </a:prstGeom>
+          <a:noFill/>
+        </p:spPr>
+        <p:txBody>
+          <a:bodyPr wrap="square">
+            <a:spAutoFit/>
+          </a:bodyPr>
+          <a:lstStyle/>
+          <a:p>
+            <a:r>
+              <a:rPr lang="en-US" altLang="zh-CN" sz="2400" b="1" dirty="0">
+                <a:latin typeface="Times New Roman" panose="02020603050405020304" pitchFamily="18" charset="0"/>
+                <a:cs typeface="Times New Roman" panose="02020603050405020304" pitchFamily="18" charset="0"/>
+              </a:rPr>
+              <a:t>02 | Market Analysis</a:t>
+            </a:r>
+            <a:endParaRPr lang="zh-CN" altLang="en-US" sz="2400" b="1" dirty="0">
+              <a:latin typeface="Times New Roman" panose="02020603050405020304" pitchFamily="18" charset="0"/>
+              <a:cs typeface="Times New Roman" panose="02020603050405020304" pitchFamily="18" charset="0"/>
+            </a:endParaRPr>
+          </a:p>
+        </p:txBody>
+      </p:sp>
+      <p:sp>
+        <p:nvSpPr>
+          <p:cNvPr id="8" name="文本框 7">
+            <a:extLst>
+              <a:ext uri="{FF2B5EF4-FFF2-40B4-BE49-F238E27FC236}">
+                <a16:creationId xmlns:a16="http://schemas.microsoft.com/office/drawing/2014/main" id="{1E403AE4-4584-4C5A-ACEE-5A8EAEBC34AB}"/>
+              </a:ext>
+            </a:extLst>
+          </p:cNvPr>
+          <p:cNvSpPr txBox="1"/>
+          <p:nvPr/>
+        </p:nvSpPr>
+        <p:spPr>
+          <a:xfrm>
+            <a:off x="609600" y="2532007"/>
+            <a:ext cx="6543040" cy="461665"/>
+          </a:xfrm>
+          <a:prstGeom prst="rect">
+            <a:avLst/>
+          </a:prstGeom>
+          <a:noFill/>
+        </p:spPr>
+        <p:txBody>
+          <a:bodyPr wrap="square">
+            <a:spAutoFit/>
+          </a:bodyPr>
+          <a:lstStyle/>
+          <a:p>
+            <a:r>
+              <a:rPr lang="en-US" altLang="zh-CN" sz="2400" b="1" dirty="0">
+                <a:latin typeface="Times New Roman" panose="02020603050405020304" pitchFamily="18" charset="0"/>
+                <a:cs typeface="Times New Roman" panose="02020603050405020304" pitchFamily="18" charset="0"/>
+              </a:rPr>
+              <a:t>03 | Methods</a:t>
+            </a:r>
+            <a:endParaRPr lang="zh-CN" altLang="en-US" sz="2400" b="1" dirty="0">
+              <a:latin typeface="Times New Roman" panose="02020603050405020304" pitchFamily="18" charset="0"/>
+              <a:cs typeface="Times New Roman" panose="02020603050405020304" pitchFamily="18" charset="0"/>
+            </a:endParaRPr>
+          </a:p>
+        </p:txBody>
+      </p:sp>
+      <p:sp>
+        <p:nvSpPr>
+          <p:cNvPr id="10" name="文本框 9">
+            <a:extLst>
+              <a:ext uri="{FF2B5EF4-FFF2-40B4-BE49-F238E27FC236}">
+                <a16:creationId xmlns:a16="http://schemas.microsoft.com/office/drawing/2014/main" id="{F398A32A-4C17-4410-8F7F-64A0336BC71E}"/>
+              </a:ext>
+            </a:extLst>
+          </p:cNvPr>
+          <p:cNvSpPr txBox="1"/>
+          <p:nvPr/>
+        </p:nvSpPr>
+        <p:spPr>
+          <a:xfrm>
+            <a:off x="609600" y="3186649"/>
+            <a:ext cx="7747553" cy="461665"/>
+          </a:xfrm>
+          <a:prstGeom prst="rect">
+            <a:avLst/>
+          </a:prstGeom>
+          <a:noFill/>
+        </p:spPr>
+        <p:txBody>
+          <a:bodyPr wrap="square">
+            <a:spAutoFit/>
+          </a:bodyPr>
+          <a:lstStyle/>
+          <a:p>
+            <a:r>
+              <a:rPr lang="en-US" altLang="zh-CN" sz="2400" b="1" dirty="0">
+                <a:latin typeface="Times New Roman" panose="02020603050405020304" pitchFamily="18" charset="0"/>
+                <a:cs typeface="Times New Roman" panose="02020603050405020304" pitchFamily="18" charset="0"/>
+              </a:rPr>
+              <a:t>04 | Programming Language, Frameworks and Tools</a:t>
+            </a:r>
+            <a:endParaRPr lang="zh-CN" altLang="en-US" sz="2400" b="1" dirty="0">
+              <a:latin typeface="Times New Roman" panose="02020603050405020304" pitchFamily="18" charset="0"/>
+              <a:cs typeface="Times New Roman" panose="02020603050405020304" pitchFamily="18" charset="0"/>
+            </a:endParaRPr>
+          </a:p>
+        </p:txBody>
+      </p:sp>
+      <p:sp>
+        <p:nvSpPr>
+          <p:cNvPr id="12" name="文本框 11">
+            <a:extLst>
+              <a:ext uri="{FF2B5EF4-FFF2-40B4-BE49-F238E27FC236}">
+                <a16:creationId xmlns:a16="http://schemas.microsoft.com/office/drawing/2014/main" id="{99A49E66-A302-4C89-A4FE-00E7F5D55216}"/>
+              </a:ext>
+            </a:extLst>
+          </p:cNvPr>
+          <p:cNvSpPr txBox="1"/>
+          <p:nvPr/>
+        </p:nvSpPr>
+        <p:spPr>
+          <a:xfrm>
+            <a:off x="609600" y="3841291"/>
+            <a:ext cx="6543040" cy="461665"/>
+          </a:xfrm>
+          <a:prstGeom prst="rect">
+            <a:avLst/>
+          </a:prstGeom>
+          <a:noFill/>
+        </p:spPr>
+        <p:txBody>
+          <a:bodyPr wrap="square">
+            <a:spAutoFit/>
+          </a:bodyPr>
+          <a:lstStyle/>
+          <a:p>
+            <a:r>
+              <a:rPr lang="en-US" altLang="zh-CN" sz="2400" b="1" dirty="0">
+                <a:latin typeface="Times New Roman" panose="02020603050405020304" pitchFamily="18" charset="0"/>
+                <a:cs typeface="Times New Roman" panose="02020603050405020304" pitchFamily="18" charset="0"/>
+              </a:rPr>
+              <a:t>05 | Process</a:t>
+            </a:r>
+            <a:endParaRPr lang="zh-CN" altLang="en-US" sz="2400" b="1" dirty="0">
+              <a:latin typeface="Times New Roman" panose="02020603050405020304" pitchFamily="18" charset="0"/>
+              <a:cs typeface="Times New Roman" panose="02020603050405020304" pitchFamily="18" charset="0"/>
+            </a:endParaRPr>
+          </a:p>
+        </p:txBody>
+      </p:sp>
+      <p:sp>
+        <p:nvSpPr>
+          <p:cNvPr id="14" name="文本框 13">
+            <a:extLst>
+              <a:ext uri="{FF2B5EF4-FFF2-40B4-BE49-F238E27FC236}">
+                <a16:creationId xmlns:a16="http://schemas.microsoft.com/office/drawing/2014/main" id="{7CCA5F97-402B-444E-8E44-32F107870968}"/>
+              </a:ext>
+            </a:extLst>
+          </p:cNvPr>
+          <p:cNvSpPr txBox="1"/>
+          <p:nvPr/>
+        </p:nvSpPr>
+        <p:spPr>
+          <a:xfrm>
+            <a:off x="612533" y="4495933"/>
+            <a:ext cx="6543040" cy="461665"/>
+          </a:xfrm>
+          <a:prstGeom prst="rect">
+            <a:avLst/>
+          </a:prstGeom>
+          <a:noFill/>
+        </p:spPr>
+        <p:txBody>
+          <a:bodyPr wrap="square">
+            <a:spAutoFit/>
+          </a:bodyPr>
+          <a:lstStyle/>
+          <a:p>
+            <a:r>
+              <a:rPr lang="en-US" altLang="zh-CN" sz="2400" b="1" dirty="0">
+                <a:latin typeface="Times New Roman" panose="02020603050405020304" pitchFamily="18" charset="0"/>
+                <a:cs typeface="Times New Roman" panose="02020603050405020304" pitchFamily="18" charset="0"/>
+              </a:rPr>
+              <a:t>06 | Project risk management</a:t>
+            </a:r>
+            <a:endParaRPr lang="zh-CN" altLang="en-US" sz="2400" b="1" dirty="0">
+              <a:latin typeface="Times New Roman" panose="02020603050405020304" pitchFamily="18" charset="0"/>
+              <a:cs typeface="Times New Roman" panose="02020603050405020304" pitchFamily="18" charset="0"/>
+            </a:endParaRPr>
+          </a:p>
+        </p:txBody>
+      </p:sp>
+      <p:sp>
+        <p:nvSpPr>
+          <p:cNvPr id="16" name="文本框 15">
+            <a:extLst>
+              <a:ext uri="{FF2B5EF4-FFF2-40B4-BE49-F238E27FC236}">
+                <a16:creationId xmlns:a16="http://schemas.microsoft.com/office/drawing/2014/main" id="{1D96EF15-98DF-4045-9944-EB6FA105FE3D}"/>
+              </a:ext>
+            </a:extLst>
+          </p:cNvPr>
+          <p:cNvSpPr txBox="1"/>
+          <p:nvPr/>
+        </p:nvSpPr>
+        <p:spPr>
+          <a:xfrm>
+            <a:off x="609600" y="5150575"/>
+            <a:ext cx="6543040" cy="461665"/>
+          </a:xfrm>
+          <a:prstGeom prst="rect">
+            <a:avLst/>
+          </a:prstGeom>
+          <a:noFill/>
+        </p:spPr>
+        <p:txBody>
+          <a:bodyPr wrap="square">
+            <a:spAutoFit/>
+          </a:bodyPr>
+          <a:lstStyle/>
+          <a:p>
+            <a:r>
+              <a:rPr lang="en-US" altLang="zh-CN" sz="2400" b="1" dirty="0">
+                <a:latin typeface="Times New Roman" panose="02020603050405020304" pitchFamily="18" charset="0"/>
+                <a:cs typeface="Times New Roman" panose="02020603050405020304" pitchFamily="18" charset="0"/>
+              </a:rPr>
+              <a:t>07 | Project schedule</a:t>
+            </a:r>
+            <a:endParaRPr lang="zh-CN" altLang="en-US" sz="2400" b="1" dirty="0">
+              <a:latin typeface="Times New Roman" panose="02020603050405020304" pitchFamily="18" charset="0"/>
+              <a:cs typeface="Times New Roman" panose="02020603050405020304" pitchFamily="18" charset="0"/>
+            </a:endParaRPr>
+          </a:p>
+        </p:txBody>
+      </p:sp>
+      <p:sp>
+        <p:nvSpPr>
+          <p:cNvPr id="2" name="灯片编号占位符 1">
+            <a:extLst>
+              <a:ext uri="{FF2B5EF4-FFF2-40B4-BE49-F238E27FC236}">
+                <a16:creationId xmlns:a16="http://schemas.microsoft.com/office/drawing/2014/main" id="{4197A178-058B-4F67-A456-04CCE57EC11F}"/>
+              </a:ext>
+            </a:extLst>
+          </p:cNvPr>
+          <p:cNvSpPr>
+            <a:spLocks noGrp="1"/>
+          </p:cNvSpPr>
+          <p:nvPr>
+            <p:ph type="sldNum" sz="quarter" idx="12"/>
+          </p:nvPr>
+        </p:nvSpPr>
+        <p:spPr/>
+        <p:txBody>
+          <a:bodyPr/>
+          <a:lstStyle/>
+          <a:p>
+            <a:fld id="{B4868FC9-AF3C-4454-80EF-91C4AEE13AC0}" type="slidenum">
+              <a:rPr lang="zh-CN" altLang="en-US" smtClean="0"/>
+              <a:t>2</a:t>
+            </a:fld>
+            <a:endParaRPr lang="zh-CN" altLang="en-US"/>
+          </a:p>
+        </p:txBody>
+      </p:sp>
+    </p:spTree>
+    <p:extLst>
+      <p:ext uri="{BB962C8B-B14F-4D97-AF65-F5344CB8AC3E}">
+        <p14:creationId xmlns:p14="http://schemas.microsoft.com/office/powerpoint/2010/main" val="53089657"/>
+      </p:ext>
+    </p:extLst>
+  </p:cSld>
+  <p:clrMapOvr>
+    <a:masterClrMapping/>
+  </p:clrMapOvr>
+</p:sld>
+</file>
+
+<file path=ppt/slides/slide20.xml><?xml version="1.0" encoding="utf-8"?>
 <p:sld xmlns:a="http://schemas.openxmlformats.org/drawingml/2006/main" xmlns:r="http://schemas.openxmlformats.org/officeDocument/2006/relationships" xmlns:p="http://schemas.openxmlformats.org/presentationml/2006/main">
   <p:cSld>
     <p:bg>
@@ -17090,402 +17707,7 @@
 </p:sld>
 </file>
 
-<file path=ppt/slides/slide2.xml><?xml version="1.0" encoding="utf-8"?>
-<p:sld xmlns:a="http://schemas.openxmlformats.org/drawingml/2006/main" xmlns:r="http://schemas.openxmlformats.org/officeDocument/2006/relationships" xmlns:p="http://schemas.openxmlformats.org/presentationml/2006/main">
-  <p:cSld>
-    <p:spTree>
-      <p:nvGrpSpPr>
-        <p:cNvPr id="1" name=""/>
-        <p:cNvGrpSpPr/>
-        <p:nvPr/>
-      </p:nvGrpSpPr>
-      <p:grpSpPr>
-        <a:xfrm>
-          <a:off x="0" y="0"/>
-          <a:ext cx="0" cy="0"/>
-          <a:chOff x="0" y="0"/>
-          <a:chExt cx="0" cy="0"/>
-        </a:xfrm>
-      </p:grpSpPr>
-      <p:sp>
-        <p:nvSpPr>
-          <p:cNvPr id="4" name="文本框 3">
-            <a:extLst>
-              <a:ext uri="{FF2B5EF4-FFF2-40B4-BE49-F238E27FC236}">
-                <a16:creationId xmlns:a16="http://schemas.microsoft.com/office/drawing/2014/main" id="{D529DC3D-4B51-4BA9-89BB-AFE326F7D787}"/>
-              </a:ext>
-            </a:extLst>
-          </p:cNvPr>
-          <p:cNvSpPr txBox="1"/>
-          <p:nvPr/>
-        </p:nvSpPr>
-        <p:spPr>
-          <a:xfrm>
-            <a:off x="344402" y="313325"/>
-            <a:ext cx="2640513" cy="707886"/>
-          </a:xfrm>
-          <a:prstGeom prst="rect">
-            <a:avLst/>
-          </a:prstGeom>
-          <a:noFill/>
-        </p:spPr>
-        <p:txBody>
-          <a:bodyPr wrap="square" rtlCol="0">
-            <a:spAutoFit/>
-          </a:bodyPr>
-          <a:lstStyle/>
-          <a:p>
-            <a:r>
-              <a:rPr lang="en-US" altLang="zh-CN" sz="4000" b="1" dirty="0">
-                <a:latin typeface="Times New Roman" panose="02020603050405020304" pitchFamily="18" charset="0"/>
-                <a:cs typeface="Times New Roman" panose="02020603050405020304" pitchFamily="18" charset="0"/>
-              </a:rPr>
-              <a:t>Contents</a:t>
-            </a:r>
-            <a:endParaRPr lang="zh-CN" altLang="en-US" sz="4000" b="1" dirty="0">
-              <a:latin typeface="Times New Roman" panose="02020603050405020304" pitchFamily="18" charset="0"/>
-              <a:cs typeface="Times New Roman" panose="02020603050405020304" pitchFamily="18" charset="0"/>
-            </a:endParaRPr>
-          </a:p>
-        </p:txBody>
-      </p:sp>
-      <p:sp>
-        <p:nvSpPr>
-          <p:cNvPr id="5" name="文本框 4">
-            <a:extLst>
-              <a:ext uri="{FF2B5EF4-FFF2-40B4-BE49-F238E27FC236}">
-                <a16:creationId xmlns:a16="http://schemas.microsoft.com/office/drawing/2014/main" id="{733F408E-51A1-40CB-8000-F65F3BDF3340}"/>
-              </a:ext>
-            </a:extLst>
-          </p:cNvPr>
-          <p:cNvSpPr txBox="1"/>
-          <p:nvPr/>
-        </p:nvSpPr>
-        <p:spPr>
-          <a:xfrm>
-            <a:off x="609600" y="1217602"/>
-            <a:ext cx="6543040" cy="461665"/>
-          </a:xfrm>
-          <a:prstGeom prst="rect">
-            <a:avLst/>
-          </a:prstGeom>
-          <a:noFill/>
-        </p:spPr>
-        <p:txBody>
-          <a:bodyPr wrap="square">
-            <a:spAutoFit/>
-          </a:bodyPr>
-          <a:lstStyle/>
-          <a:p>
-            <a:r>
-              <a:rPr lang="en-US" altLang="zh-CN" sz="2400" b="1" dirty="0">
-                <a:latin typeface="Times New Roman" panose="02020603050405020304" pitchFamily="18" charset="0"/>
-                <a:cs typeface="Times New Roman" panose="02020603050405020304" pitchFamily="18" charset="0"/>
-              </a:rPr>
-              <a:t>01 | Problem Definition and Goal</a:t>
-            </a:r>
-            <a:endParaRPr lang="zh-CN" altLang="en-US" sz="2400" b="1" dirty="0">
-              <a:latin typeface="Times New Roman" panose="02020603050405020304" pitchFamily="18" charset="0"/>
-              <a:cs typeface="Times New Roman" panose="02020603050405020304" pitchFamily="18" charset="0"/>
-            </a:endParaRPr>
-          </a:p>
-        </p:txBody>
-      </p:sp>
-      <p:sp>
-        <p:nvSpPr>
-          <p:cNvPr id="6" name="文本框 5">
-            <a:extLst>
-              <a:ext uri="{FF2B5EF4-FFF2-40B4-BE49-F238E27FC236}">
-                <a16:creationId xmlns:a16="http://schemas.microsoft.com/office/drawing/2014/main" id="{48A37062-2E67-4904-93CD-A141E881BD08}"/>
-              </a:ext>
-            </a:extLst>
-          </p:cNvPr>
-          <p:cNvSpPr txBox="1"/>
-          <p:nvPr/>
-        </p:nvSpPr>
-        <p:spPr>
-          <a:xfrm>
-            <a:off x="609600" y="1873951"/>
-            <a:ext cx="6543040" cy="461665"/>
-          </a:xfrm>
-          <a:prstGeom prst="rect">
-            <a:avLst/>
-          </a:prstGeom>
-          <a:noFill/>
-        </p:spPr>
-        <p:txBody>
-          <a:bodyPr wrap="square">
-            <a:spAutoFit/>
-          </a:bodyPr>
-          <a:lstStyle/>
-          <a:p>
-            <a:r>
-              <a:rPr lang="en-US" altLang="zh-CN" sz="2400" b="1" dirty="0">
-                <a:latin typeface="Times New Roman" panose="02020603050405020304" pitchFamily="18" charset="0"/>
-                <a:cs typeface="Times New Roman" panose="02020603050405020304" pitchFamily="18" charset="0"/>
-              </a:rPr>
-              <a:t>02 | Market Analysis</a:t>
-            </a:r>
-            <a:endParaRPr lang="zh-CN" altLang="en-US" sz="2400" b="1" dirty="0">
-              <a:latin typeface="Times New Roman" panose="02020603050405020304" pitchFamily="18" charset="0"/>
-              <a:cs typeface="Times New Roman" panose="02020603050405020304" pitchFamily="18" charset="0"/>
-            </a:endParaRPr>
-          </a:p>
-        </p:txBody>
-      </p:sp>
-      <p:sp>
-        <p:nvSpPr>
-          <p:cNvPr id="8" name="文本框 7">
-            <a:extLst>
-              <a:ext uri="{FF2B5EF4-FFF2-40B4-BE49-F238E27FC236}">
-                <a16:creationId xmlns:a16="http://schemas.microsoft.com/office/drawing/2014/main" id="{1E403AE4-4584-4C5A-ACEE-5A8EAEBC34AB}"/>
-              </a:ext>
-            </a:extLst>
-          </p:cNvPr>
-          <p:cNvSpPr txBox="1"/>
-          <p:nvPr/>
-        </p:nvSpPr>
-        <p:spPr>
-          <a:xfrm>
-            <a:off x="609600" y="2532007"/>
-            <a:ext cx="6543040" cy="461665"/>
-          </a:xfrm>
-          <a:prstGeom prst="rect">
-            <a:avLst/>
-          </a:prstGeom>
-          <a:noFill/>
-        </p:spPr>
-        <p:txBody>
-          <a:bodyPr wrap="square">
-            <a:spAutoFit/>
-          </a:bodyPr>
-          <a:lstStyle/>
-          <a:p>
-            <a:r>
-              <a:rPr lang="en-US" altLang="zh-CN" sz="2400" b="1" dirty="0">
-                <a:latin typeface="Times New Roman" panose="02020603050405020304" pitchFamily="18" charset="0"/>
-                <a:cs typeface="Times New Roman" panose="02020603050405020304" pitchFamily="18" charset="0"/>
-              </a:rPr>
-              <a:t>03 | Methods</a:t>
-            </a:r>
-            <a:endParaRPr lang="zh-CN" altLang="en-US" sz="2400" b="1" dirty="0">
-              <a:latin typeface="Times New Roman" panose="02020603050405020304" pitchFamily="18" charset="0"/>
-              <a:cs typeface="Times New Roman" panose="02020603050405020304" pitchFamily="18" charset="0"/>
-            </a:endParaRPr>
-          </a:p>
-        </p:txBody>
-      </p:sp>
-      <p:sp>
-        <p:nvSpPr>
-          <p:cNvPr id="10" name="文本框 9">
-            <a:extLst>
-              <a:ext uri="{FF2B5EF4-FFF2-40B4-BE49-F238E27FC236}">
-                <a16:creationId xmlns:a16="http://schemas.microsoft.com/office/drawing/2014/main" id="{F398A32A-4C17-4410-8F7F-64A0336BC71E}"/>
-              </a:ext>
-            </a:extLst>
-          </p:cNvPr>
-          <p:cNvSpPr txBox="1"/>
-          <p:nvPr/>
-        </p:nvSpPr>
-        <p:spPr>
-          <a:xfrm>
-            <a:off x="609600" y="3186649"/>
-            <a:ext cx="7747553" cy="461665"/>
-          </a:xfrm>
-          <a:prstGeom prst="rect">
-            <a:avLst/>
-          </a:prstGeom>
-          <a:noFill/>
-        </p:spPr>
-        <p:txBody>
-          <a:bodyPr wrap="square">
-            <a:spAutoFit/>
-          </a:bodyPr>
-          <a:lstStyle/>
-          <a:p>
-            <a:r>
-              <a:rPr lang="en-US" altLang="zh-CN" sz="2400" b="1" dirty="0">
-                <a:latin typeface="Times New Roman" panose="02020603050405020304" pitchFamily="18" charset="0"/>
-                <a:cs typeface="Times New Roman" panose="02020603050405020304" pitchFamily="18" charset="0"/>
-              </a:rPr>
-              <a:t>04 | Programming Language, Frameworks and Tools</a:t>
-            </a:r>
-            <a:endParaRPr lang="zh-CN" altLang="en-US" sz="2400" b="1" dirty="0">
-              <a:latin typeface="Times New Roman" panose="02020603050405020304" pitchFamily="18" charset="0"/>
-              <a:cs typeface="Times New Roman" panose="02020603050405020304" pitchFamily="18" charset="0"/>
-            </a:endParaRPr>
-          </a:p>
-        </p:txBody>
-      </p:sp>
-      <p:sp>
-        <p:nvSpPr>
-          <p:cNvPr id="12" name="文本框 11">
-            <a:extLst>
-              <a:ext uri="{FF2B5EF4-FFF2-40B4-BE49-F238E27FC236}">
-                <a16:creationId xmlns:a16="http://schemas.microsoft.com/office/drawing/2014/main" id="{99A49E66-A302-4C89-A4FE-00E7F5D55216}"/>
-              </a:ext>
-            </a:extLst>
-          </p:cNvPr>
-          <p:cNvSpPr txBox="1"/>
-          <p:nvPr/>
-        </p:nvSpPr>
-        <p:spPr>
-          <a:xfrm>
-            <a:off x="609600" y="3841291"/>
-            <a:ext cx="6543040" cy="461665"/>
-          </a:xfrm>
-          <a:prstGeom prst="rect">
-            <a:avLst/>
-          </a:prstGeom>
-          <a:noFill/>
-        </p:spPr>
-        <p:txBody>
-          <a:bodyPr wrap="square">
-            <a:spAutoFit/>
-          </a:bodyPr>
-          <a:lstStyle/>
-          <a:p>
-            <a:r>
-              <a:rPr lang="en-US" altLang="zh-CN" sz="2400" b="1" dirty="0">
-                <a:latin typeface="Times New Roman" panose="02020603050405020304" pitchFamily="18" charset="0"/>
-                <a:cs typeface="Times New Roman" panose="02020603050405020304" pitchFamily="18" charset="0"/>
-              </a:rPr>
-              <a:t>05 | Process</a:t>
-            </a:r>
-            <a:endParaRPr lang="zh-CN" altLang="en-US" sz="2400" b="1" dirty="0">
-              <a:latin typeface="Times New Roman" panose="02020603050405020304" pitchFamily="18" charset="0"/>
-              <a:cs typeface="Times New Roman" panose="02020603050405020304" pitchFamily="18" charset="0"/>
-            </a:endParaRPr>
-          </a:p>
-        </p:txBody>
-      </p:sp>
-      <p:sp>
-        <p:nvSpPr>
-          <p:cNvPr id="14" name="文本框 13">
-            <a:extLst>
-              <a:ext uri="{FF2B5EF4-FFF2-40B4-BE49-F238E27FC236}">
-                <a16:creationId xmlns:a16="http://schemas.microsoft.com/office/drawing/2014/main" id="{7CCA5F97-402B-444E-8E44-32F107870968}"/>
-              </a:ext>
-            </a:extLst>
-          </p:cNvPr>
-          <p:cNvSpPr txBox="1"/>
-          <p:nvPr/>
-        </p:nvSpPr>
-        <p:spPr>
-          <a:xfrm>
-            <a:off x="612533" y="4495933"/>
-            <a:ext cx="6543040" cy="461665"/>
-          </a:xfrm>
-          <a:prstGeom prst="rect">
-            <a:avLst/>
-          </a:prstGeom>
-          <a:noFill/>
-        </p:spPr>
-        <p:txBody>
-          <a:bodyPr wrap="square">
-            <a:spAutoFit/>
-          </a:bodyPr>
-          <a:lstStyle/>
-          <a:p>
-            <a:r>
-              <a:rPr lang="en-US" altLang="zh-CN" sz="2400" b="1" dirty="0">
-                <a:latin typeface="Times New Roman" panose="02020603050405020304" pitchFamily="18" charset="0"/>
-                <a:cs typeface="Times New Roman" panose="02020603050405020304" pitchFamily="18" charset="0"/>
-              </a:rPr>
-              <a:t>06 | Project risk management</a:t>
-            </a:r>
-            <a:endParaRPr lang="zh-CN" altLang="en-US" sz="2400" b="1" dirty="0">
-              <a:latin typeface="Times New Roman" panose="02020603050405020304" pitchFamily="18" charset="0"/>
-              <a:cs typeface="Times New Roman" panose="02020603050405020304" pitchFamily="18" charset="0"/>
-            </a:endParaRPr>
-          </a:p>
-        </p:txBody>
-      </p:sp>
-      <p:sp>
-        <p:nvSpPr>
-          <p:cNvPr id="16" name="文本框 15">
-            <a:extLst>
-              <a:ext uri="{FF2B5EF4-FFF2-40B4-BE49-F238E27FC236}">
-                <a16:creationId xmlns:a16="http://schemas.microsoft.com/office/drawing/2014/main" id="{1D96EF15-98DF-4045-9944-EB6FA105FE3D}"/>
-              </a:ext>
-            </a:extLst>
-          </p:cNvPr>
-          <p:cNvSpPr txBox="1"/>
-          <p:nvPr/>
-        </p:nvSpPr>
-        <p:spPr>
-          <a:xfrm>
-            <a:off x="609600" y="5150575"/>
-            <a:ext cx="6543040" cy="461665"/>
-          </a:xfrm>
-          <a:prstGeom prst="rect">
-            <a:avLst/>
-          </a:prstGeom>
-          <a:noFill/>
-        </p:spPr>
-        <p:txBody>
-          <a:bodyPr wrap="square">
-            <a:spAutoFit/>
-          </a:bodyPr>
-          <a:lstStyle/>
-          <a:p>
-            <a:r>
-              <a:rPr lang="en-US" altLang="zh-CN" sz="2400" b="1" dirty="0">
-                <a:latin typeface="Times New Roman" panose="02020603050405020304" pitchFamily="18" charset="0"/>
-                <a:cs typeface="Times New Roman" panose="02020603050405020304" pitchFamily="18" charset="0"/>
-              </a:rPr>
-              <a:t>07 | Project schedule</a:t>
-            </a:r>
-            <a:endParaRPr lang="zh-CN" altLang="en-US" sz="2400" b="1" dirty="0">
-              <a:latin typeface="Times New Roman" panose="02020603050405020304" pitchFamily="18" charset="0"/>
-              <a:cs typeface="Times New Roman" panose="02020603050405020304" pitchFamily="18" charset="0"/>
-            </a:endParaRPr>
-          </a:p>
-        </p:txBody>
-      </p:sp>
-      <p:sp>
-        <p:nvSpPr>
-          <p:cNvPr id="2" name="灯片编号占位符 1">
-            <a:extLst>
-              <a:ext uri="{FF2B5EF4-FFF2-40B4-BE49-F238E27FC236}">
-                <a16:creationId xmlns:a16="http://schemas.microsoft.com/office/drawing/2014/main" id="{4197A178-058B-4F67-A456-04CCE57EC11F}"/>
-              </a:ext>
-            </a:extLst>
-          </p:cNvPr>
-          <p:cNvSpPr>
-            <a:spLocks noGrp="1"/>
-          </p:cNvSpPr>
-          <p:nvPr>
-            <p:ph type="sldNum" sz="quarter" idx="12"/>
-          </p:nvPr>
-        </p:nvSpPr>
-        <p:spPr/>
-        <p:txBody>
-          <a:bodyPr/>
-          <a:lstStyle/>
-          <a:p>
-            <a:fld id="{B4868FC9-AF3C-4454-80EF-91C4AEE13AC0}" type="slidenum">
-              <a:rPr lang="zh-CN" altLang="en-US" smtClean="0"/>
-              <a:t>2</a:t>
-            </a:fld>
-            <a:endParaRPr lang="zh-CN" altLang="en-US"/>
-          </a:p>
-        </p:txBody>
-      </p:sp>
-    </p:spTree>
-    <p:extLst>
-      <p:ext uri="{BB962C8B-B14F-4D97-AF65-F5344CB8AC3E}">
-        <p14:creationId xmlns:p14="http://schemas.microsoft.com/office/powerpoint/2010/main" val="53089657"/>
-      </p:ext>
-    </p:extLst>
-  </p:cSld>
-  <p:clrMapOvr>
-    <a:masterClrMapping/>
-  </p:clrMapOvr>
-</p:sld>
-</file>
-
-<file path=ppt/slides/slide20.xml><?xml version="1.0" encoding="utf-8"?>
+<file path=ppt/slides/slide21.xml><?xml version="1.0" encoding="utf-8"?>
 <p:sld xmlns:a="http://schemas.openxmlformats.org/drawingml/2006/main" xmlns:r="http://schemas.openxmlformats.org/officeDocument/2006/relationships" xmlns:p="http://schemas.openxmlformats.org/presentationml/2006/main">
   <p:cSld>
     <p:spTree>
@@ -17830,7 +18052,7 @@
           <a:p>
             <a:fld id="{B4868FC9-AF3C-4454-80EF-91C4AEE13AC0}" type="slidenum">
               <a:rPr lang="zh-CN" altLang="en-US" smtClean="0"/>
-              <a:t>20</a:t>
+              <a:t>21</a:t>
             </a:fld>
             <a:endParaRPr lang="zh-CN" altLang="en-US"/>
           </a:p>
@@ -17849,7 +18071,7 @@
 </p:sld>
 </file>
 
-<file path=ppt/slides/slide21.xml><?xml version="1.0" encoding="utf-8"?>
+<file path=ppt/slides/slide22.xml><?xml version="1.0" encoding="utf-8"?>
 <p:sld xmlns:a="http://schemas.openxmlformats.org/drawingml/2006/main" xmlns:r="http://schemas.openxmlformats.org/officeDocument/2006/relationships" xmlns:p="http://schemas.openxmlformats.org/presentationml/2006/main">
   <p:cSld>
     <p:bg>
@@ -18553,7 +18775,7 @@
 </p:sld>
 </file>
 
-<file path=ppt/slides/slide22.xml><?xml version="1.0" encoding="utf-8"?>
+<file path=ppt/slides/slide23.xml><?xml version="1.0" encoding="utf-8"?>
 <p:sld xmlns:a="http://schemas.openxmlformats.org/drawingml/2006/main" xmlns:r="http://schemas.openxmlformats.org/officeDocument/2006/relationships" xmlns:p="http://schemas.openxmlformats.org/presentationml/2006/main">
   <p:cSld>
     <p:spTree>
@@ -18787,7 +19009,7 @@
           <a:p>
             <a:fld id="{B4868FC9-AF3C-4454-80EF-91C4AEE13AC0}" type="slidenum">
               <a:rPr lang="zh-CN" altLang="en-US" smtClean="0"/>
-              <a:t>22</a:t>
+              <a:t>23</a:t>
             </a:fld>
             <a:endParaRPr lang="zh-CN" altLang="en-US"/>
           </a:p>
@@ -18806,7 +19028,7 @@
 </p:sld>
 </file>
 
-<file path=ppt/slides/slide23.xml><?xml version="1.0" encoding="utf-8"?>
+<file path=ppt/slides/slide24.xml><?xml version="1.0" encoding="utf-8"?>
 <p:sld xmlns:a="http://schemas.openxmlformats.org/drawingml/2006/main" xmlns:r="http://schemas.openxmlformats.org/officeDocument/2006/relationships" xmlns:p="http://schemas.openxmlformats.org/presentationml/2006/main">
   <p:cSld>
     <p:spTree>
@@ -19063,7 +19285,7 @@
           <a:p>
             <a:fld id="{B4868FC9-AF3C-4454-80EF-91C4AEE13AC0}" type="slidenum">
               <a:rPr lang="zh-CN" altLang="en-US" smtClean="0"/>
-              <a:t>23</a:t>
+              <a:t>24</a:t>
             </a:fld>
             <a:endParaRPr lang="zh-CN" altLang="en-US"/>
           </a:p>
@@ -19082,7 +19304,7 @@
 </p:sld>
 </file>
 
-<file path=ppt/slides/slide24.xml><?xml version="1.0" encoding="utf-8"?>
+<file path=ppt/slides/slide25.xml><?xml version="1.0" encoding="utf-8"?>
 <p:sld xmlns:a="http://schemas.openxmlformats.org/drawingml/2006/main" xmlns:r="http://schemas.openxmlformats.org/officeDocument/2006/relationships" xmlns:p="http://schemas.openxmlformats.org/presentationml/2006/main">
   <p:cSld>
     <p:spTree>
@@ -19170,7 +19392,7 @@
           <a:p>
             <a:fld id="{B4868FC9-AF3C-4454-80EF-91C4AEE13AC0}" type="slidenum">
               <a:rPr lang="zh-CN" altLang="en-US" smtClean="0"/>
-              <a:t>24</a:t>
+              <a:t>25</a:t>
             </a:fld>
             <a:endParaRPr lang="zh-CN" altLang="en-US"/>
           </a:p>
@@ -19444,8 +19666,8 @@
   <p:transition spd="slow">
     <p:push dir="u"/>
   </p:transition>
-  <mc:AlternateContent xmlns:mc="http://schemas.openxmlformats.org/markup-compatibility/2006">
-    <mc:Choice xmlns:p14="http://schemas.microsoft.com/office/powerpoint/2010/main" Requires="p14">
+  <mc:AlternateContent xmlns:mc="http://schemas.openxmlformats.org/markup-compatibility/2006" xmlns:p14="http://schemas.microsoft.com/office/powerpoint/2010/main">
+    <mc:Choice Requires="p14">
       <p:timing>
         <p:tnLst>
           <p:par>
@@ -19648,7 +19870,7 @@
         </p:bldLst>
       </p:timing>
     </mc:Choice>
-    <mc:Fallback>
+    <mc:Fallback xmlns="">
       <p:timing>
         <p:tnLst>
           <p:par>
@@ -21156,8 +21378,8 @@
   <p:transition spd="slow">
     <p:push dir="u"/>
   </p:transition>
-  <mc:AlternateContent xmlns:mc="http://schemas.openxmlformats.org/markup-compatibility/2006">
-    <mc:Choice xmlns:p14="http://schemas.microsoft.com/office/powerpoint/2010/main" Requires="p14">
+  <mc:AlternateContent xmlns:mc="http://schemas.openxmlformats.org/markup-compatibility/2006" xmlns:p14="http://schemas.microsoft.com/office/powerpoint/2010/main">
+    <mc:Choice Requires="p14">
       <p:timing>
         <p:tnLst>
           <p:par>
@@ -21360,7 +21582,7 @@
         </p:bldLst>
       </p:timing>
     </mc:Choice>
-    <mc:Fallback>
+    <mc:Fallback xmlns="">
       <p:timing>
         <p:tnLst>
           <p:par>

</xml_diff>